<commit_message>
update poster with new screenshot of results
</commit_message>
<xml_diff>
--- a/Documentation/Poster.pptx
+++ b/Documentation/Poster.pptx
@@ -240,7 +240,7 @@
               <a:rPr lang="en-US" smtClean="0">
                 <a:latin typeface="Verdana Regular" charset="0"/>
               </a:rPr>
-              <a:t>12/2/2019</a:t>
+              <a:t>12/3/2019</a:t>
             </a:fld>
             <a:endParaRPr lang="en-US" dirty="0">
               <a:latin typeface="Verdana Regular" charset="0"/>
@@ -418,7 +418,7 @@
             <a:fld id="{9CF59EBC-EC05-6B4D-B166-DDFA6A1EDCB6}" type="datetimeFigureOut">
               <a:rPr lang="en-US" smtClean="0"/>
               <a:pPr/>
-              <a:t>12/2/2019</a:t>
+              <a:t>12/3/2019</a:t>
             </a:fld>
             <a:endParaRPr lang="en-US" dirty="0"/>
           </a:p>
@@ -1618,7 +1618,7 @@
       </p:grpSpPr>
       <p:pic>
         <p:nvPicPr>
-          <p:cNvPr id="18" name="Picture Placeholder 17">
+          <p:cNvPr id="18" name="Picture Placeholder 17" descr="GCrawler Data Flow and Code Samples">
             <a:extLst>
               <a:ext uri="{FF2B5EF4-FFF2-40B4-BE49-F238E27FC236}">
                 <a16:creationId xmlns:a16="http://schemas.microsoft.com/office/drawing/2014/main" id="{2B94CB35-FE0B-4AAF-9787-90E832039432}"/>
@@ -1639,14 +1639,14 @@
         </p:blipFill>
         <p:spPr>
           <a:xfrm>
-            <a:off x="2983971" y="8918575"/>
-            <a:ext cx="17277821" cy="18495963"/>
+            <a:off x="1931988" y="8919140"/>
+            <a:ext cx="19778343" cy="16103550"/>
           </a:xfrm>
         </p:spPr>
       </p:pic>
       <p:pic>
         <p:nvPicPr>
-          <p:cNvPr id="16" name="Picture Placeholder 15" descr="A screenshot of a cell phone&#10;&#10;Description automatically generated">
+          <p:cNvPr id="16" name="Picture Placeholder 15" descr="GCrawler Search Form">
             <a:extLst>
               <a:ext uri="{FF2B5EF4-FFF2-40B4-BE49-F238E27FC236}">
                 <a16:creationId xmlns:a16="http://schemas.microsoft.com/office/drawing/2014/main" id="{30067219-4AFF-4739-87BE-BC1ABA610624}"/>
@@ -1676,7 +1676,7 @@
       </p:pic>
       <p:pic>
         <p:nvPicPr>
-          <p:cNvPr id="14" name="Picture Placeholder 13" descr="A close up of a necklace&#10;&#10;Description automatically generated">
+          <p:cNvPr id="14" name="Picture Placeholder 13">
             <a:extLst>
               <a:ext uri="{FF2B5EF4-FFF2-40B4-BE49-F238E27FC236}">
                 <a16:creationId xmlns:a16="http://schemas.microsoft.com/office/drawing/2014/main" id="{E9D1BA2C-0A7B-4E24-B3F7-63B381600750}"/>
@@ -1692,12 +1692,15 @@
         </p:nvPicPr>
         <p:blipFill>
           <a:blip r:embed="rId5"/>
-          <a:srcRect t="1972" b="1972"/>
-          <a:stretch>
-            <a:fillRect/>
-          </a:stretch>
+          <a:srcRect/>
+          <a:stretch/>
         </p:blipFill>
-        <p:spPr/>
+        <p:spPr>
+          <a:xfrm>
+            <a:off x="22429930" y="9401344"/>
+            <a:ext cx="19381645" cy="9054556"/>
+          </a:xfrm>
+        </p:spPr>
       </p:pic>
       <p:sp>
         <p:nvSpPr>
@@ -2269,7 +2272,7 @@
         <p:spPr>
           <a:xfrm>
             <a:off x="1931989" y="5503233"/>
-            <a:ext cx="38953999" cy="3800745"/>
+            <a:ext cx="39879586" cy="3800745"/>
           </a:xfrm>
           <a:prstGeom prst="rect">
             <a:avLst/>
@@ -2449,7 +2452,7 @@
                 <a:ea typeface="Georgia" charset="0"/>
                 <a:cs typeface="Georgia" charset="0"/>
               </a:rPr>
-              <a:t>The GCrawler project is a graphical web crawler which crawls a user-supplied website, following links on each page as it goes. It displays a color-coded graph of what pages were crawled and how it reached each page. Try it out here: </a:t>
+              <a:t>The GCrawler project is a graphical web crawler which crawls a user-supplied website, following links on each page as it goes. It displays a color-coded graph of what pages were crawled and how it reached each page. Try it: </a:t>
             </a:r>
             <a:r>
               <a:rPr lang="en-US" sz="7200" dirty="0">
@@ -2458,7 +2461,7 @@
                 <a:cs typeface="Georgia" charset="0"/>
                 <a:hlinkClick r:id="rId6"/>
               </a:rPr>
-              <a:t>GCrawler App</a:t>
+              <a:t>https://gcrawler-test.herokuapp.com/search</a:t>
             </a:r>
             <a:endParaRPr lang="en-US" sz="7200" dirty="0">
               <a:latin typeface="Georgia" charset="0"/>
@@ -3038,6 +3041,59 @@
               </a:rPr>
               <a:t>Gcrawler: Graphical web crawler</a:t>
             </a:r>
+          </a:p>
+        </p:txBody>
+      </p:sp>
+      <p:sp>
+        <p:nvSpPr>
+          <p:cNvPr id="2" name="TextBox 1">
+            <a:extLst>
+              <a:ext uri="{FF2B5EF4-FFF2-40B4-BE49-F238E27FC236}">
+                <a16:creationId xmlns:a16="http://schemas.microsoft.com/office/drawing/2014/main" id="{880379BF-3B0C-4778-BA54-25154BD9FE07}"/>
+              </a:ext>
+            </a:extLst>
+          </p:cNvPr>
+          <p:cNvSpPr txBox="1"/>
+          <p:nvPr/>
+        </p:nvSpPr>
+        <p:spPr>
+          <a:xfrm>
+            <a:off x="1931988" y="25275328"/>
+            <a:ext cx="19778344" cy="2308324"/>
+          </a:xfrm>
+          <a:prstGeom prst="rect">
+            <a:avLst/>
+          </a:prstGeom>
+          <a:noFill/>
+        </p:spPr>
+        <p:txBody>
+          <a:bodyPr wrap="square" rtlCol="0">
+            <a:spAutoFit/>
+          </a:bodyPr>
+          <a:lstStyle/>
+          <a:p>
+            <a:r>
+              <a:rPr lang="en-US" sz="7200" dirty="0" err="1">
+                <a:latin typeface="Georgia" panose="02040502050405020303" pitchFamily="18" charset="0"/>
+              </a:rPr>
+              <a:t>GCrawler</a:t>
+            </a:r>
+            <a:r>
+              <a:rPr lang="en-US" sz="7200" dirty="0">
+                <a:latin typeface="Georgia" panose="02040502050405020303" pitchFamily="18" charset="0"/>
+              </a:rPr>
+              <a:t> Code Repository: </a:t>
+            </a:r>
+            <a:r>
+              <a:rPr lang="en-US" sz="7200" dirty="0">
+                <a:latin typeface="Georgia" panose="02040502050405020303" pitchFamily="18" charset="0"/>
+                <a:hlinkClick r:id="rId13"/>
+              </a:rPr>
+              <a:t>https://github.com/metzgerb/cs467-project</a:t>
+            </a:r>
+            <a:endParaRPr lang="en-US" sz="7200" dirty="0">
+              <a:latin typeface="Georgia" panose="02040502050405020303" pitchFamily="18" charset="0"/>
+            </a:endParaRPr>
           </a:p>
         </p:txBody>
       </p:sp>

</xml_diff>